<commit_message>
update pre 22 mar lab
</commit_message>
<xml_diff>
--- a/resources/03_NetworkStructure.pptx
+++ b/resources/03_NetworkStructure.pptx
@@ -216,7 +216,7 @@
             <a:fld id="{607AE066-929E-4C9D-ABCF-990BD1072CD3}" type="datetimeFigureOut">
               <a:rPr lang="en-US" smtClean="0"/>
               <a:pPr/>
-              <a:t>3/20/2018</a:t>
+              <a:t>3/21/2018</a:t>
             </a:fld>
             <a:endParaRPr lang="en-US"/>
           </a:p>
@@ -994,46 +994,69 @@
           <a:p>
             <a:r>
               <a:rPr lang="en-US" dirty="0" smtClean="0"/>
-              <a:t>Neighborhood</a:t>
+              <a:t>BC Neighborhood</a:t>
             </a:r>
             <a:r>
               <a:rPr lang="en-US" baseline="0" dirty="0" smtClean="0"/>
-              <a:t> overlap = 1/4</a:t>
+              <a:t> </a:t>
+            </a:r>
+            <a:r>
+              <a:rPr lang="en-US" baseline="0" dirty="0" smtClean="0"/>
+              <a:t>overlap = </a:t>
+            </a:r>
+            <a:r>
+              <a:rPr lang="en-US" baseline="0" dirty="0" smtClean="0"/>
+              <a:t>¼</a:t>
             </a:r>
             <a:endParaRPr lang="en-US" dirty="0" smtClean="0"/>
           </a:p>
           <a:p>
+            <a:r>
+              <a:rPr lang="en-US" dirty="0" smtClean="0"/>
+              <a:t>Neighbors</a:t>
+            </a:r>
+            <a:r>
+              <a:rPr lang="en-US" dirty="0" smtClean="0"/>
+              <a:t>: 4</a:t>
+            </a:r>
+          </a:p>
+          <a:p>
+            <a:r>
+              <a:rPr lang="en-US" dirty="0" smtClean="0"/>
+              <a:t>B: G, F, A, </a:t>
+            </a:r>
+            <a:r>
+              <a:rPr lang="en-US" dirty="0" smtClean="0"/>
+              <a:t>(C)</a:t>
+            </a:r>
             <a:endParaRPr lang="en-US" dirty="0" smtClean="0"/>
           </a:p>
           <a:p>
             <a:r>
               <a:rPr lang="en-US" dirty="0" smtClean="0"/>
-              <a:t>Neighbors: 4</a:t>
-            </a:r>
-          </a:p>
-          <a:p>
+              <a:t>C: </a:t>
+            </a:r>
             <a:r>
               <a:rPr lang="en-US" dirty="0" smtClean="0"/>
-              <a:t>B: G, F, A, C</a:t>
+              <a:t>(B),</a:t>
+            </a:r>
+            <a:r>
+              <a:rPr lang="en-US" baseline="0" dirty="0" smtClean="0"/>
+              <a:t> </a:t>
+            </a:r>
+            <a:r>
+              <a:rPr lang="en-US" baseline="0" dirty="0" smtClean="0"/>
+              <a:t>A, D</a:t>
             </a:r>
           </a:p>
           <a:p>
             <a:r>
               <a:rPr lang="en-US" dirty="0" smtClean="0"/>
-              <a:t>C: B,</a:t>
-            </a:r>
-            <a:r>
-              <a:rPr lang="en-US" baseline="0" dirty="0" smtClean="0"/>
-              <a:t> A, D</a:t>
-            </a:r>
-          </a:p>
-          <a:p>
-            <a:endParaRPr lang="en-US" baseline="0" dirty="0" smtClean="0"/>
-          </a:p>
-          <a:p>
+              <a:t>Shared</a:t>
+            </a:r>
             <a:r>
               <a:rPr lang="en-US" dirty="0" smtClean="0"/>
-              <a:t>Shared:</a:t>
+              <a:t>:</a:t>
             </a:r>
             <a:r>
               <a:rPr lang="en-US" baseline="0" dirty="0" smtClean="0"/>
@@ -1045,6 +1068,28 @@
               <a:rPr lang="en-US" baseline="0" dirty="0" smtClean="0"/>
               <a:t>A</a:t>
             </a:r>
+          </a:p>
+          <a:p>
+            <a:endParaRPr lang="en-US" baseline="0" dirty="0" smtClean="0"/>
+          </a:p>
+          <a:p>
+            <a:r>
+              <a:rPr lang="en-US" baseline="0" dirty="0" smtClean="0"/>
+              <a:t>AB Neighborhood overlap: 0</a:t>
+            </a:r>
+          </a:p>
+          <a:p>
+            <a:r>
+              <a:rPr lang="en-US" baseline="0" dirty="0" smtClean="0"/>
+              <a:t>Neighbors: 8</a:t>
+            </a:r>
+          </a:p>
+          <a:p>
+            <a:r>
+              <a:rPr lang="en-US" baseline="0" dirty="0" smtClean="0"/>
+              <a:t>Shared: 0</a:t>
+            </a:r>
+            <a:endParaRPr lang="en-US" baseline="0" dirty="0" smtClean="0"/>
           </a:p>
         </p:txBody>
       </p:sp>
@@ -1268,7 +1313,7 @@
             <a:fld id="{53169529-68D7-4B27-AE22-45CE24A50B5C}" type="datetimeFigureOut">
               <a:rPr lang="en-US" smtClean="0"/>
               <a:pPr/>
-              <a:t>3/20/2018</a:t>
+              <a:t>3/21/2018</a:t>
             </a:fld>
             <a:endParaRPr lang="en-US"/>
           </a:p>
@@ -1518,7 +1563,7 @@
             <a:fld id="{53169529-68D7-4B27-AE22-45CE24A50B5C}" type="datetimeFigureOut">
               <a:rPr lang="en-US" smtClean="0"/>
               <a:pPr/>
-              <a:t>3/20/2018</a:t>
+              <a:t>3/21/2018</a:t>
             </a:fld>
             <a:endParaRPr lang="en-US"/>
           </a:p>
@@ -1685,7 +1730,7 @@
             <a:fld id="{53169529-68D7-4B27-AE22-45CE24A50B5C}" type="datetimeFigureOut">
               <a:rPr lang="en-US" smtClean="0"/>
               <a:pPr/>
-              <a:t>3/20/2018</a:t>
+              <a:t>3/21/2018</a:t>
             </a:fld>
             <a:endParaRPr lang="en-US"/>
           </a:p>
@@ -1862,7 +1907,7 @@
             <a:fld id="{53169529-68D7-4B27-AE22-45CE24A50B5C}" type="datetimeFigureOut">
               <a:rPr lang="en-US" smtClean="0"/>
               <a:pPr/>
-              <a:t>3/20/2018</a:t>
+              <a:t>3/21/2018</a:t>
             </a:fld>
             <a:endParaRPr lang="en-US"/>
           </a:p>
@@ -2022,7 +2067,7 @@
                   <a:spcPct val="100000"/>
                 </a:lnSpc>
               </a:pPr>
-              <a:t>3/20/2018</a:t>
+              <a:t>3/21/2018</a:t>
             </a:fld>
             <a:endParaRPr lang="en-US" sz="1200" b="0" strike="noStrike" spc="-1">
               <a:latin typeface="Times New Roman"/>
@@ -2179,7 +2224,7 @@
                   <a:spcPct val="100000"/>
                 </a:lnSpc>
               </a:pPr>
-              <a:t>3/20/2018</a:t>
+              <a:t>3/21/2018</a:t>
             </a:fld>
             <a:endParaRPr lang="en-US" sz="1200" b="0" strike="noStrike" spc="-1">
               <a:latin typeface="Times New Roman"/>
@@ -2615,7 +2660,7 @@
                   <a:spcPct val="100000"/>
                 </a:lnSpc>
               </a:pPr>
-              <a:t>3/20/2018</a:t>
+              <a:t>3/21/2018</a:t>
             </a:fld>
             <a:endParaRPr lang="en-US" sz="1200" b="0" strike="noStrike" spc="-1">
               <a:latin typeface="Times New Roman"/>
@@ -2869,7 +2914,7 @@
                   <a:spcPct val="100000"/>
                 </a:lnSpc>
               </a:pPr>
-              <a:t>3/20/2018</a:t>
+              <a:t>3/21/2018</a:t>
             </a:fld>
             <a:endParaRPr lang="en-US" sz="1200" b="0" strike="noStrike" spc="-1">
               <a:latin typeface="Times New Roman"/>
@@ -3072,7 +3117,7 @@
                   <a:spcPct val="100000"/>
                 </a:lnSpc>
               </a:pPr>
-              <a:t>3/20/2018</a:t>
+              <a:t>3/21/2018</a:t>
             </a:fld>
             <a:endParaRPr lang="en-US" sz="1200" b="0" strike="noStrike" spc="-1">
               <a:latin typeface="Times New Roman"/>
@@ -3823,7 +3868,7 @@
             <a:fld id="{53169529-68D7-4B27-AE22-45CE24A50B5C}" type="datetimeFigureOut">
               <a:rPr lang="en-US" smtClean="0"/>
               <a:pPr/>
-              <a:t>3/20/2018</a:t>
+              <a:t>3/21/2018</a:t>
             </a:fld>
             <a:endParaRPr lang="en-US"/>
           </a:p>
@@ -3944,7 +3989,7 @@
                   <a:spcPct val="100000"/>
                 </a:lnSpc>
               </a:pPr>
-              <a:t>3/20/2018</a:t>
+              <a:t>3/21/2018</a:t>
             </a:fld>
             <a:endParaRPr lang="en-US" sz="1200" b="0" strike="noStrike" spc="-1">
               <a:latin typeface="Times New Roman"/>
@@ -4516,7 +4561,7 @@
                   <a:spcPct val="100000"/>
                 </a:lnSpc>
               </a:pPr>
-              <a:t>3/20/2018</a:t>
+              <a:t>3/21/2018</a:t>
             </a:fld>
             <a:endParaRPr lang="en-US" sz="1200" b="0" strike="noStrike" spc="-1">
               <a:latin typeface="Times New Roman"/>
@@ -4839,7 +4884,7 @@
             <a:fld id="{53169529-68D7-4B27-AE22-45CE24A50B5C}" type="datetimeFigureOut">
               <a:rPr lang="en-US" smtClean="0"/>
               <a:pPr/>
-              <a:t>3/20/2018</a:t>
+              <a:t>3/21/2018</a:t>
             </a:fld>
             <a:endParaRPr lang="en-US"/>
           </a:p>
@@ -5084,7 +5129,7 @@
             <a:fld id="{53169529-68D7-4B27-AE22-45CE24A50B5C}" type="datetimeFigureOut">
               <a:rPr lang="en-US" smtClean="0"/>
               <a:pPr/>
-              <a:t>3/20/2018</a:t>
+              <a:t>3/21/2018</a:t>
             </a:fld>
             <a:endParaRPr lang="en-US"/>
           </a:p>
@@ -5369,7 +5414,7 @@
             <a:fld id="{53169529-68D7-4B27-AE22-45CE24A50B5C}" type="datetimeFigureOut">
               <a:rPr lang="en-US" smtClean="0"/>
               <a:pPr/>
-              <a:t>3/20/2018</a:t>
+              <a:t>3/21/2018</a:t>
             </a:fld>
             <a:endParaRPr lang="en-US"/>
           </a:p>
@@ -5788,7 +5833,7 @@
             <a:fld id="{53169529-68D7-4B27-AE22-45CE24A50B5C}" type="datetimeFigureOut">
               <a:rPr lang="en-US" smtClean="0"/>
               <a:pPr/>
-              <a:t>3/20/2018</a:t>
+              <a:t>3/21/2018</a:t>
             </a:fld>
             <a:endParaRPr lang="en-US"/>
           </a:p>
@@ -5903,7 +5948,7 @@
             <a:fld id="{53169529-68D7-4B27-AE22-45CE24A50B5C}" type="datetimeFigureOut">
               <a:rPr lang="en-US" smtClean="0"/>
               <a:pPr/>
-              <a:t>3/20/2018</a:t>
+              <a:t>3/21/2018</a:t>
             </a:fld>
             <a:endParaRPr lang="en-US"/>
           </a:p>
@@ -5995,7 +6040,7 @@
             <a:fld id="{53169529-68D7-4B27-AE22-45CE24A50B5C}" type="datetimeFigureOut">
               <a:rPr lang="en-US" smtClean="0"/>
               <a:pPr/>
-              <a:t>3/20/2018</a:t>
+              <a:t>3/21/2018</a:t>
             </a:fld>
             <a:endParaRPr lang="en-US"/>
           </a:p>
@@ -6269,7 +6314,7 @@
             <a:fld id="{53169529-68D7-4B27-AE22-45CE24A50B5C}" type="datetimeFigureOut">
               <a:rPr lang="en-US" smtClean="0"/>
               <a:pPr/>
-              <a:t>3/20/2018</a:t>
+              <a:t>3/21/2018</a:t>
             </a:fld>
             <a:endParaRPr lang="en-US"/>
           </a:p>
@@ -6479,7 +6524,7 @@
             <a:fld id="{53169529-68D7-4B27-AE22-45CE24A50B5C}" type="datetimeFigureOut">
               <a:rPr lang="en-US" smtClean="0"/>
               <a:pPr/>
-              <a:t>3/20/2018</a:t>
+              <a:t>3/21/2018</a:t>
             </a:fld>
             <a:endParaRPr lang="en-US"/>
           </a:p>
@@ -7107,7 +7152,7 @@
                   <a:spcPct val="100000"/>
                 </a:lnSpc>
               </a:pPr>
-              <a:t>3/20/2018</a:t>
+              <a:t>3/21/2018</a:t>
             </a:fld>
             <a:endParaRPr lang="en-US" sz="1200" b="0" strike="noStrike" spc="-1">
               <a:latin typeface="Times New Roman"/>
@@ -7488,7 +7533,7 @@
                   <a:spcPct val="100000"/>
                 </a:lnSpc>
               </a:pPr>
-              <a:t>3/20/2018</a:t>
+              <a:t>3/21/2018</a:t>
             </a:fld>
             <a:endParaRPr lang="en-US" sz="1200" b="0" strike="noStrike" spc="-1">
               <a:latin typeface="Times New Roman"/>
@@ -10920,9 +10965,16 @@
             <p:ph idx="1"/>
           </p:nvPr>
         </p:nvSpPr>
-        <p:spPr/>
-        <p:txBody>
-          <a:bodyPr/>
+        <p:spPr>
+          <a:xfrm>
+            <a:off x="457200" y="1600200"/>
+            <a:ext cx="8229600" cy="4800600"/>
+          </a:xfrm>
+        </p:spPr>
+        <p:txBody>
+          <a:bodyPr>
+            <a:normAutofit lnSpcReduction="10000"/>
+          </a:bodyPr>
           <a:lstStyle/>
           <a:p>
             <a:pPr>
@@ -11070,8 +11122,18 @@
             </a:r>
             <a:r>
               <a:rPr lang="en-US" dirty="0" smtClean="0"/>
-              <a:t>) &gt; 2</a:t>
-            </a:r>
+              <a:t>) &gt; </a:t>
+            </a:r>
+            <a:r>
+              <a:rPr lang="en-US" dirty="0" smtClean="0"/>
+              <a:t>2</a:t>
+            </a:r>
+          </a:p>
+          <a:p>
+            <a:pPr>
+              <a:buNone/>
+            </a:pPr>
+            <a:endParaRPr lang="en-US" dirty="0" smtClean="0"/>
           </a:p>
           <a:p>
             <a:pPr>
@@ -11416,6 +11478,94 @@
           </a:p>
         </p:txBody>
       </p:sp>
+      <p:grpSp>
+        <p:nvGrpSpPr>
+          <p:cNvPr id="11" name="Group 49"/>
+          <p:cNvGrpSpPr/>
+          <p:nvPr/>
+        </p:nvGrpSpPr>
+        <p:grpSpPr>
+          <a:xfrm>
+            <a:off x="825808" y="4953000"/>
+            <a:ext cx="2755592" cy="751532"/>
+            <a:chOff x="5560729" y="6898333"/>
+            <a:chExt cx="6885503" cy="751532"/>
+          </a:xfrm>
+        </p:grpSpPr>
+        <p:sp>
+          <p:nvSpPr>
+            <p:cNvPr id="14" name="Left Brace 13"/>
+            <p:cNvSpPr/>
+            <p:nvPr/>
+          </p:nvSpPr>
+          <p:spPr>
+            <a:xfrm rot="16200000">
+              <a:off x="8719699" y="3960731"/>
+              <a:ext cx="342900" cy="6218104"/>
+            </a:xfrm>
+            <a:prstGeom prst="leftBrace">
+              <a:avLst>
+                <a:gd name="adj1" fmla="val 44154"/>
+                <a:gd name="adj2" fmla="val 50000"/>
+              </a:avLst>
+            </a:prstGeom>
+            <a:ln w="28575"/>
+          </p:spPr>
+          <p:style>
+            <a:lnRef idx="1">
+              <a:schemeClr val="accent1"/>
+            </a:lnRef>
+            <a:fillRef idx="0">
+              <a:schemeClr val="accent1"/>
+            </a:fillRef>
+            <a:effectRef idx="0">
+              <a:schemeClr val="accent1"/>
+            </a:effectRef>
+            <a:fontRef idx="minor">
+              <a:schemeClr val="tx1"/>
+            </a:fontRef>
+          </p:style>
+          <p:txBody>
+            <a:bodyPr rtlCol="0" anchor="ctr"/>
+            <a:lstStyle/>
+            <a:p>
+              <a:pPr algn="ctr"/>
+              <a:endParaRPr lang="en-US"/>
+            </a:p>
+          </p:txBody>
+        </p:sp>
+        <p:sp>
+          <p:nvSpPr>
+            <p:cNvPr id="15" name="TextBox 14"/>
+            <p:cNvSpPr txBox="1"/>
+            <p:nvPr/>
+          </p:nvSpPr>
+          <p:spPr>
+            <a:xfrm>
+              <a:off x="5560729" y="7188200"/>
+              <a:ext cx="6885503" cy="461665"/>
+            </a:xfrm>
+            <a:prstGeom prst="rect">
+              <a:avLst/>
+            </a:prstGeom>
+            <a:noFill/>
+          </p:spPr>
+          <p:txBody>
+            <a:bodyPr wrap="square" rtlCol="0">
+              <a:spAutoFit/>
+            </a:bodyPr>
+            <a:lstStyle/>
+            <a:p>
+              <a:pPr algn="ctr"/>
+              <a:r>
+                <a:rPr lang="en-US" sz="2400" dirty="0" smtClean="0"/>
+                <a:t>span of local bridge</a:t>
+              </a:r>
+              <a:endParaRPr lang="en-US" sz="2400" dirty="0"/>
+            </a:p>
+          </p:txBody>
+        </p:sp>
+      </p:grpSp>
     </p:spTree>
   </p:cSld>
   <p:clrMapOvr>
@@ -11455,11 +11605,7 @@
                                           </p:stCondLst>
                                         </p:cTn>
                                         <p:tgtEl>
-                                          <p:spTgt spid="3">
-                                            <p:txEl>
-                                              <p:pRg st="5" end="5"/>
-                                            </p:txEl>
-                                          </p:spTgt>
+                                          <p:spTgt spid="11"/>
                                         </p:tgtEl>
                                         <p:attrNameLst>
                                           <p:attrName>style.visibility</p:attrName>
@@ -11504,7 +11650,11 @@
                                           </p:stCondLst>
                                         </p:cTn>
                                         <p:tgtEl>
-                                          <p:spTgt spid="51202"/>
+                                          <p:spTgt spid="3">
+                                            <p:txEl>
+                                              <p:pRg st="6" end="6"/>
+                                            </p:txEl>
+                                          </p:spTgt>
                                         </p:tgtEl>
                                         <p:attrNameLst>
                                           <p:attrName>style.visibility</p:attrName>
@@ -11536,7 +11686,7 @@
                             </p:stCondLst>
                             <p:childTnLst>
                               <p:par>
-                                <p:cTn id="13" presetID="1" presetClass="entr" presetSubtype="0" fill="hold" grpId="0" nodeType="clickEffect">
+                                <p:cTn id="13" presetID="1" presetClass="entr" presetSubtype="0" fill="hold" nodeType="clickEffect">
                                   <p:stCondLst>
                                     <p:cond delay="0"/>
                                   </p:stCondLst>
@@ -11549,7 +11699,7 @@
                                           </p:stCondLst>
                                         </p:cTn>
                                         <p:tgtEl>
-                                          <p:spTgt spid="5"/>
+                                          <p:spTgt spid="51202"/>
                                         </p:tgtEl>
                                         <p:attrNameLst>
                                           <p:attrName>style.visibility</p:attrName>
@@ -11594,7 +11744,7 @@
                                           </p:stCondLst>
                                         </p:cTn>
                                         <p:tgtEl>
-                                          <p:spTgt spid="6"/>
+                                          <p:spTgt spid="5"/>
                                         </p:tgtEl>
                                         <p:attrNameLst>
                                           <p:attrName>style.visibility</p:attrName>
@@ -11639,7 +11789,7 @@
                                           </p:stCondLst>
                                         </p:cTn>
                                         <p:tgtEl>
-                                          <p:spTgt spid="9"/>
+                                          <p:spTgt spid="6"/>
                                         </p:tgtEl>
                                         <p:attrNameLst>
                                           <p:attrName>style.visibility</p:attrName>
@@ -11652,35 +11802,26 @@
                                   </p:childTnLst>
                                 </p:cTn>
                               </p:par>
+                            </p:childTnLst>
+                          </p:cTn>
+                        </p:par>
+                      </p:childTnLst>
+                    </p:cTn>
+                  </p:par>
+                  <p:par>
+                    <p:cTn id="23" fill="hold">
+                      <p:stCondLst>
+                        <p:cond delay="indefinite"/>
+                      </p:stCondLst>
+                      <p:childTnLst>
+                        <p:par>
+                          <p:cTn id="24" fill="hold">
+                            <p:stCondLst>
+                              <p:cond delay="0"/>
+                            </p:stCondLst>
+                            <p:childTnLst>
                               <p:par>
-                                <p:cTn id="23" presetID="1" presetClass="entr" presetSubtype="0" fill="hold" grpId="0" nodeType="withEffect">
-                                  <p:stCondLst>
-                                    <p:cond delay="0"/>
-                                  </p:stCondLst>
-                                  <p:childTnLst>
-                                    <p:set>
-                                      <p:cBhvr>
-                                        <p:cTn id="24" dur="1" fill="hold">
-                                          <p:stCondLst>
-                                            <p:cond delay="0"/>
-                                          </p:stCondLst>
-                                        </p:cTn>
-                                        <p:tgtEl>
-                                          <p:spTgt spid="13"/>
-                                        </p:tgtEl>
-                                        <p:attrNameLst>
-                                          <p:attrName>style.visibility</p:attrName>
-                                        </p:attrNameLst>
-                                      </p:cBhvr>
-                                      <p:to>
-                                        <p:strVal val="visible"/>
-                                      </p:to>
-                                    </p:set>
-                                  </p:childTnLst>
-                                </p:cTn>
-                              </p:par>
-                              <p:par>
-                                <p:cTn id="25" presetID="1" presetClass="entr" presetSubtype="0" fill="hold" grpId="0" nodeType="withEffect">
+                                <p:cTn id="25" presetID="1" presetClass="entr" presetSubtype="0" fill="hold" grpId="0" nodeType="clickEffect">
                                   <p:stCondLst>
                                     <p:cond delay="0"/>
                                   </p:stCondLst>
@@ -11693,7 +11834,7 @@
                                           </p:stCondLst>
                                         </p:cTn>
                                         <p:tgtEl>
-                                          <p:spTgt spid="12"/>
+                                          <p:spTgt spid="9"/>
                                         </p:tgtEl>
                                         <p:attrNameLst>
                                           <p:attrName>style.visibility</p:attrName>
@@ -11715,6 +11856,60 @@
                                     <p:set>
                                       <p:cBhvr>
                                         <p:cTn id="28" dur="1" fill="hold">
+                                          <p:stCondLst>
+                                            <p:cond delay="0"/>
+                                          </p:stCondLst>
+                                        </p:cTn>
+                                        <p:tgtEl>
+                                          <p:spTgt spid="13"/>
+                                        </p:tgtEl>
+                                        <p:attrNameLst>
+                                          <p:attrName>style.visibility</p:attrName>
+                                        </p:attrNameLst>
+                                      </p:cBhvr>
+                                      <p:to>
+                                        <p:strVal val="visible"/>
+                                      </p:to>
+                                    </p:set>
+                                  </p:childTnLst>
+                                </p:cTn>
+                              </p:par>
+                              <p:par>
+                                <p:cTn id="29" presetID="1" presetClass="entr" presetSubtype="0" fill="hold" grpId="0" nodeType="withEffect">
+                                  <p:stCondLst>
+                                    <p:cond delay="0"/>
+                                  </p:stCondLst>
+                                  <p:childTnLst>
+                                    <p:set>
+                                      <p:cBhvr>
+                                        <p:cTn id="30" dur="1" fill="hold">
+                                          <p:stCondLst>
+                                            <p:cond delay="0"/>
+                                          </p:stCondLst>
+                                        </p:cTn>
+                                        <p:tgtEl>
+                                          <p:spTgt spid="12"/>
+                                        </p:tgtEl>
+                                        <p:attrNameLst>
+                                          <p:attrName>style.visibility</p:attrName>
+                                        </p:attrNameLst>
+                                      </p:cBhvr>
+                                      <p:to>
+                                        <p:strVal val="visible"/>
+                                      </p:to>
+                                    </p:set>
+                                  </p:childTnLst>
+                                </p:cTn>
+                              </p:par>
+                              <p:par>
+                                <p:cTn id="31" presetID="1" presetClass="entr" presetSubtype="0" fill="hold" grpId="0" nodeType="withEffect">
+                                  <p:stCondLst>
+                                    <p:cond delay="0"/>
+                                  </p:stCondLst>
+                                  <p:childTnLst>
+                                    <p:set>
+                                      <p:cBhvr>
+                                        <p:cTn id="32" dur="1" fill="hold">
                                           <p:stCondLst>
                                             <p:cond delay="0"/>
                                           </p:stCondLst>
@@ -14846,11 +15041,7 @@
             </a:r>
             <a:r>
               <a:rPr lang="en-US" dirty="0" smtClean="0"/>
-              <a:t>: Lab </a:t>
-            </a:r>
-            <a:r>
-              <a:rPr lang="en-US" dirty="0" smtClean="0"/>
-              <a:t>Thursday, 22</a:t>
+              <a:t>: Lab Thursday, 22</a:t>
             </a:r>
             <a:r>
               <a:rPr lang="en-US" baseline="30000" dirty="0" smtClean="0"/>
@@ -14923,13 +15114,8 @@
             </a:r>
             <a:r>
               <a:rPr lang="en-US" dirty="0" smtClean="0"/>
-              <a:t>: Please check the course syllabus for updates. </a:t>
-            </a:r>
-            <a:r>
-              <a:rPr lang="en-US" dirty="0" smtClean="0"/>
-              <a:t>The allowance for missed classes has increased to 3. However, this means there will be very few special exceptions.</a:t>
-            </a:r>
-            <a:endParaRPr lang="en-US" dirty="0" smtClean="0"/>
+              <a:t>: Please check the course syllabus for updates. The allowance for missed classes has increased to 3. However, this means there will be very few special exceptions.</a:t>
+            </a:r>
           </a:p>
           <a:p>
             <a:endParaRPr lang="en-US" dirty="0"/>

</xml_diff>